<commit_message>
Updated Form an Equation
</commit_message>
<xml_diff>
--- a/Strategies/Form an equation.pptx
+++ b/Strategies/Form an equation.pptx
@@ -5,10 +5,10 @@
     <p:sldMasterId id="2147483648" r:id="rId1"/>
   </p:sldMasterIdLst>
   <p:notesMasterIdLst>
-    <p:notesMasterId r:id="rId33"/>
+    <p:notesMasterId r:id="rId35"/>
   </p:notesMasterIdLst>
   <p:handoutMasterIdLst>
-    <p:handoutMasterId r:id="rId34"/>
+    <p:handoutMasterId r:id="rId36"/>
   </p:handoutMasterIdLst>
   <p:sldIdLst>
     <p:sldId id="256" r:id="rId2"/>
@@ -21,27 +21,29 @@
     <p:sldId id="265" r:id="rId9"/>
     <p:sldId id="266" r:id="rId10"/>
     <p:sldId id="273" r:id="rId11"/>
-    <p:sldId id="288" r:id="rId12"/>
-    <p:sldId id="286" r:id="rId13"/>
-    <p:sldId id="292" r:id="rId14"/>
-    <p:sldId id="268" r:id="rId15"/>
-    <p:sldId id="290" r:id="rId16"/>
-    <p:sldId id="277" r:id="rId17"/>
-    <p:sldId id="281" r:id="rId18"/>
-    <p:sldId id="267" r:id="rId19"/>
-    <p:sldId id="274" r:id="rId20"/>
-    <p:sldId id="269" r:id="rId21"/>
-    <p:sldId id="289" r:id="rId22"/>
-    <p:sldId id="282" r:id="rId23"/>
-    <p:sldId id="284" r:id="rId24"/>
-    <p:sldId id="287" r:id="rId25"/>
-    <p:sldId id="291" r:id="rId26"/>
-    <p:sldId id="271" r:id="rId27"/>
-    <p:sldId id="275" r:id="rId28"/>
-    <p:sldId id="276" r:id="rId29"/>
-    <p:sldId id="278" r:id="rId30"/>
-    <p:sldId id="279" r:id="rId31"/>
-    <p:sldId id="280" r:id="rId32"/>
+    <p:sldId id="293" r:id="rId12"/>
+    <p:sldId id="294" r:id="rId13"/>
+    <p:sldId id="288" r:id="rId14"/>
+    <p:sldId id="286" r:id="rId15"/>
+    <p:sldId id="292" r:id="rId16"/>
+    <p:sldId id="268" r:id="rId17"/>
+    <p:sldId id="290" r:id="rId18"/>
+    <p:sldId id="277" r:id="rId19"/>
+    <p:sldId id="281" r:id="rId20"/>
+    <p:sldId id="267" r:id="rId21"/>
+    <p:sldId id="274" r:id="rId22"/>
+    <p:sldId id="269" r:id="rId23"/>
+    <p:sldId id="289" r:id="rId24"/>
+    <p:sldId id="282" r:id="rId25"/>
+    <p:sldId id="284" r:id="rId26"/>
+    <p:sldId id="287" r:id="rId27"/>
+    <p:sldId id="291" r:id="rId28"/>
+    <p:sldId id="271" r:id="rId29"/>
+    <p:sldId id="275" r:id="rId30"/>
+    <p:sldId id="276" r:id="rId31"/>
+    <p:sldId id="278" r:id="rId32"/>
+    <p:sldId id="279" r:id="rId33"/>
+    <p:sldId id="280" r:id="rId34"/>
   </p:sldIdLst>
   <p:sldSz cx="12192000" cy="6858000"/>
   <p:notesSz cx="9144000" cy="6858000"/>
@@ -167,6 +169,8 @@
         </p14:section>
         <p14:section name="Problems" id="{79EE8874-A4F3-8346-B3B6-2C654A50BF48}">
           <p14:sldIdLst>
+            <p14:sldId id="293"/>
+            <p14:sldId id="294"/>
             <p14:sldId id="288"/>
             <p14:sldId id="286"/>
             <p14:sldId id="292"/>
@@ -297,7 +301,7 @@
           <a:p>
             <a:fld id="{3C079910-DFEE-4A43-961D-13F803B7A9AE}" type="datetimeFigureOut">
               <a:rPr lang="en-AU" smtClean="0"/>
-              <a:t>1/2/18</a:t>
+              <a:t>20/2/18</a:t>
             </a:fld>
             <a:endParaRPr lang="en-AU"/>
           </a:p>
@@ -474,7 +478,7 @@
           <a:p>
             <a:fld id="{E4041AC9-6939-6042-9B64-B91A8FB2F9FC}" type="datetimeFigureOut">
               <a:rPr lang="en-AU" smtClean="0"/>
-              <a:t>29/1/18</a:t>
+              <a:t>20/2/18</a:t>
             </a:fld>
             <a:endParaRPr lang="en-AU"/>
           </a:p>
@@ -986,7 +990,7 @@
           <a:p>
             <a:fld id="{D9EE6953-D307-DE41-9B6A-F62E0C4D4ECE}" type="slidenum">
               <a:rPr lang="en-AU" smtClean="0"/>
-              <a:t>11</a:t>
+              <a:t>13</a:t>
             </a:fld>
             <a:endParaRPr lang="en-AU"/>
           </a:p>
@@ -1078,7 +1082,7 @@
           <a:p>
             <a:fld id="{D9EE6953-D307-DE41-9B6A-F62E0C4D4ECE}" type="slidenum">
               <a:rPr lang="en-AU" smtClean="0"/>
-              <a:t>12</a:t>
+              <a:t>14</a:t>
             </a:fld>
             <a:endParaRPr lang="en-AU"/>
           </a:p>
@@ -1170,7 +1174,7 @@
           <a:p>
             <a:fld id="{D9EE6953-D307-DE41-9B6A-F62E0C4D4ECE}" type="slidenum">
               <a:rPr lang="en-AU" smtClean="0"/>
-              <a:t>13</a:t>
+              <a:t>15</a:t>
             </a:fld>
             <a:endParaRPr lang="en-AU"/>
           </a:p>
@@ -1262,7 +1266,7 @@
           <a:p>
             <a:fld id="{D9EE6953-D307-DE41-9B6A-F62E0C4D4ECE}" type="slidenum">
               <a:rPr lang="en-AU" smtClean="0"/>
-              <a:t>14</a:t>
+              <a:t>16</a:t>
             </a:fld>
             <a:endParaRPr lang="en-AU"/>
           </a:p>
@@ -1354,7 +1358,7 @@
           <a:p>
             <a:fld id="{D9EE6953-D307-DE41-9B6A-F62E0C4D4ECE}" type="slidenum">
               <a:rPr lang="en-AU" smtClean="0"/>
-              <a:t>15</a:t>
+              <a:t>17</a:t>
             </a:fld>
             <a:endParaRPr lang="en-AU"/>
           </a:p>
@@ -1446,7 +1450,7 @@
           <a:p>
             <a:fld id="{D9EE6953-D307-DE41-9B6A-F62E0C4D4ECE}" type="slidenum">
               <a:rPr lang="en-AU" smtClean="0"/>
-              <a:t>16</a:t>
+              <a:t>18</a:t>
             </a:fld>
             <a:endParaRPr lang="en-AU"/>
           </a:p>
@@ -1538,7 +1542,7 @@
           <a:p>
             <a:fld id="{D9EE6953-D307-DE41-9B6A-F62E0C4D4ECE}" type="slidenum">
               <a:rPr lang="en-AU" smtClean="0"/>
-              <a:t>17</a:t>
+              <a:t>19</a:t>
             </a:fld>
             <a:endParaRPr lang="en-AU"/>
           </a:p>
@@ -1630,7 +1634,7 @@
           <a:p>
             <a:fld id="{D9EE6953-D307-DE41-9B6A-F62E0C4D4ECE}" type="slidenum">
               <a:rPr lang="en-AU" smtClean="0"/>
-              <a:t>18</a:t>
+              <a:t>20</a:t>
             </a:fld>
             <a:endParaRPr lang="en-AU"/>
           </a:p>
@@ -1722,7 +1726,7 @@
           <a:p>
             <a:fld id="{D9EE6953-D307-DE41-9B6A-F62E0C4D4ECE}" type="slidenum">
               <a:rPr lang="en-AU" smtClean="0"/>
-              <a:t>19</a:t>
+              <a:t>21</a:t>
             </a:fld>
             <a:endParaRPr lang="en-AU"/>
           </a:p>
@@ -1890,7 +1894,7 @@
           <a:p>
             <a:fld id="{D9EE6953-D307-DE41-9B6A-F62E0C4D4ECE}" type="slidenum">
               <a:rPr lang="en-AU" smtClean="0"/>
-              <a:t>20</a:t>
+              <a:t>22</a:t>
             </a:fld>
             <a:endParaRPr lang="en-AU"/>
           </a:p>
@@ -1974,7 +1978,7 @@
           <a:p>
             <a:fld id="{D9EE6953-D307-DE41-9B6A-F62E0C4D4ECE}" type="slidenum">
               <a:rPr lang="en-AU" smtClean="0"/>
-              <a:t>21</a:t>
+              <a:t>23</a:t>
             </a:fld>
             <a:endParaRPr lang="en-AU"/>
           </a:p>
@@ -2058,7 +2062,7 @@
           <a:p>
             <a:fld id="{D9EE6953-D307-DE41-9B6A-F62E0C4D4ECE}" type="slidenum">
               <a:rPr lang="en-AU" smtClean="0"/>
-              <a:t>22</a:t>
+              <a:t>24</a:t>
             </a:fld>
             <a:endParaRPr lang="en-AU"/>
           </a:p>
@@ -2142,7 +2146,7 @@
           <a:p>
             <a:fld id="{D9EE6953-D307-DE41-9B6A-F62E0C4D4ECE}" type="slidenum">
               <a:rPr lang="en-AU" smtClean="0"/>
-              <a:t>23</a:t>
+              <a:t>25</a:t>
             </a:fld>
             <a:endParaRPr lang="en-AU"/>
           </a:p>
@@ -2226,7 +2230,7 @@
           <a:p>
             <a:fld id="{D9EE6953-D307-DE41-9B6A-F62E0C4D4ECE}" type="slidenum">
               <a:rPr lang="en-AU" smtClean="0"/>
-              <a:t>24</a:t>
+              <a:t>26</a:t>
             </a:fld>
             <a:endParaRPr lang="en-AU"/>
           </a:p>
@@ -2310,7 +2314,7 @@
           <a:p>
             <a:fld id="{D9EE6953-D307-DE41-9B6A-F62E0C4D4ECE}" type="slidenum">
               <a:rPr lang="en-AU" smtClean="0"/>
-              <a:t>25</a:t>
+              <a:t>27</a:t>
             </a:fld>
             <a:endParaRPr lang="en-AU"/>
           </a:p>
@@ -2394,7 +2398,7 @@
           <a:p>
             <a:fld id="{D9EE6953-D307-DE41-9B6A-F62E0C4D4ECE}" type="slidenum">
               <a:rPr lang="en-AU" smtClean="0"/>
-              <a:t>26</a:t>
+              <a:t>28</a:t>
             </a:fld>
             <a:endParaRPr lang="en-AU"/>
           </a:p>
@@ -2478,7 +2482,7 @@
           <a:p>
             <a:fld id="{D9EE6953-D307-DE41-9B6A-F62E0C4D4ECE}" type="slidenum">
               <a:rPr lang="en-AU" smtClean="0"/>
-              <a:t>27</a:t>
+              <a:t>29</a:t>
             </a:fld>
             <a:endParaRPr lang="en-AU"/>
           </a:p>
@@ -2562,7 +2566,7 @@
           <a:p>
             <a:fld id="{D9EE6953-D307-DE41-9B6A-F62E0C4D4ECE}" type="slidenum">
               <a:rPr lang="en-AU" smtClean="0"/>
-              <a:t>28</a:t>
+              <a:t>30</a:t>
             </a:fld>
             <a:endParaRPr lang="en-AU"/>
           </a:p>
@@ -2646,7 +2650,7 @@
           <a:p>
             <a:fld id="{D9EE6953-D307-DE41-9B6A-F62E0C4D4ECE}" type="slidenum">
               <a:rPr lang="en-AU" smtClean="0"/>
-              <a:t>29</a:t>
+              <a:t>31</a:t>
             </a:fld>
             <a:endParaRPr lang="en-AU"/>
           </a:p>
@@ -2814,7 +2818,7 @@
           <a:p>
             <a:fld id="{D9EE6953-D307-DE41-9B6A-F62E0C4D4ECE}" type="slidenum">
               <a:rPr lang="en-AU" smtClean="0"/>
-              <a:t>30</a:t>
+              <a:t>32</a:t>
             </a:fld>
             <a:endParaRPr lang="en-AU"/>
           </a:p>
@@ -2898,7 +2902,7 @@
           <a:p>
             <a:fld id="{D9EE6953-D307-DE41-9B6A-F62E0C4D4ECE}" type="slidenum">
               <a:rPr lang="en-AU" smtClean="0"/>
-              <a:t>31</a:t>
+              <a:t>33</a:t>
             </a:fld>
             <a:endParaRPr lang="en-AU"/>
           </a:p>
@@ -3552,7 +3556,7 @@
           <a:p>
             <a:fld id="{C6014E63-FDA4-5D46-ADE6-E559ED70081F}" type="datetimeFigureOut">
               <a:rPr lang="en-AU" smtClean="0"/>
-              <a:t>29/1/18</a:t>
+              <a:t>20/2/18</a:t>
             </a:fld>
             <a:endParaRPr lang="en-AU"/>
           </a:p>
@@ -3722,7 +3726,7 @@
           <a:p>
             <a:fld id="{C6014E63-FDA4-5D46-ADE6-E559ED70081F}" type="datetimeFigureOut">
               <a:rPr lang="en-AU" smtClean="0"/>
-              <a:t>29/1/18</a:t>
+              <a:t>20/2/18</a:t>
             </a:fld>
             <a:endParaRPr lang="en-AU"/>
           </a:p>
@@ -3902,7 +3906,7 @@
           <a:p>
             <a:fld id="{C6014E63-FDA4-5D46-ADE6-E559ED70081F}" type="datetimeFigureOut">
               <a:rPr lang="en-AU" smtClean="0"/>
-              <a:t>29/1/18</a:t>
+              <a:t>20/2/18</a:t>
             </a:fld>
             <a:endParaRPr lang="en-AU"/>
           </a:p>
@@ -4072,7 +4076,7 @@
           <a:p>
             <a:fld id="{C6014E63-FDA4-5D46-ADE6-E559ED70081F}" type="datetimeFigureOut">
               <a:rPr lang="en-AU" smtClean="0"/>
-              <a:t>29/1/18</a:t>
+              <a:t>20/2/18</a:t>
             </a:fld>
             <a:endParaRPr lang="en-AU"/>
           </a:p>
@@ -4318,7 +4322,7 @@
           <a:p>
             <a:fld id="{C6014E63-FDA4-5D46-ADE6-E559ED70081F}" type="datetimeFigureOut">
               <a:rPr lang="en-AU" smtClean="0"/>
-              <a:t>29/1/18</a:t>
+              <a:t>20/2/18</a:t>
             </a:fld>
             <a:endParaRPr lang="en-AU"/>
           </a:p>
@@ -4550,7 +4554,7 @@
           <a:p>
             <a:fld id="{C6014E63-FDA4-5D46-ADE6-E559ED70081F}" type="datetimeFigureOut">
               <a:rPr lang="en-AU" smtClean="0"/>
-              <a:t>29/1/18</a:t>
+              <a:t>20/2/18</a:t>
             </a:fld>
             <a:endParaRPr lang="en-AU"/>
           </a:p>
@@ -4917,7 +4921,7 @@
           <a:p>
             <a:fld id="{C6014E63-FDA4-5D46-ADE6-E559ED70081F}" type="datetimeFigureOut">
               <a:rPr lang="en-AU" smtClean="0"/>
-              <a:t>29/1/18</a:t>
+              <a:t>20/2/18</a:t>
             </a:fld>
             <a:endParaRPr lang="en-AU"/>
           </a:p>
@@ -5035,7 +5039,7 @@
           <a:p>
             <a:fld id="{C6014E63-FDA4-5D46-ADE6-E559ED70081F}" type="datetimeFigureOut">
               <a:rPr lang="en-AU" smtClean="0"/>
-              <a:t>29/1/18</a:t>
+              <a:t>20/2/18</a:t>
             </a:fld>
             <a:endParaRPr lang="en-AU"/>
           </a:p>
@@ -5130,7 +5134,7 @@
           <a:p>
             <a:fld id="{C6014E63-FDA4-5D46-ADE6-E559ED70081F}" type="datetimeFigureOut">
               <a:rPr lang="en-AU" smtClean="0"/>
-              <a:t>29/1/18</a:t>
+              <a:t>20/2/18</a:t>
             </a:fld>
             <a:endParaRPr lang="en-AU"/>
           </a:p>
@@ -5407,7 +5411,7 @@
           <a:p>
             <a:fld id="{C6014E63-FDA4-5D46-ADE6-E559ED70081F}" type="datetimeFigureOut">
               <a:rPr lang="en-AU" smtClean="0"/>
-              <a:t>29/1/18</a:t>
+              <a:t>20/2/18</a:t>
             </a:fld>
             <a:endParaRPr lang="en-AU"/>
           </a:p>
@@ -5660,7 +5664,7 @@
           <a:p>
             <a:fld id="{C6014E63-FDA4-5D46-ADE6-E559ED70081F}" type="datetimeFigureOut">
               <a:rPr lang="en-AU" smtClean="0"/>
-              <a:t>29/1/18</a:t>
+              <a:t>20/2/18</a:t>
             </a:fld>
             <a:endParaRPr lang="en-AU"/>
           </a:p>
@@ -5876,7 +5880,7 @@
           <a:p>
             <a:fld id="{C6014E63-FDA4-5D46-ADE6-E559ED70081F}" type="datetimeFigureOut">
               <a:rPr lang="en-AU" smtClean="0"/>
-              <a:t>29/1/18</a:t>
+              <a:t>20/2/18</a:t>
             </a:fld>
             <a:endParaRPr lang="en-AU"/>
           </a:p>
@@ -6576,6 +6580,243 @@
           <a:chExt cx="0" cy="0"/>
         </a:xfrm>
       </p:grpSpPr>
+      <p:sp>
+        <p:nvSpPr>
+          <p:cNvPr id="2" name="Title 1">
+            <a:extLst>
+              <a:ext uri="{FF2B5EF4-FFF2-40B4-BE49-F238E27FC236}">
+                <a16:creationId xmlns:a16="http://schemas.microsoft.com/office/drawing/2014/main" id="{4E7CEAC1-5706-FD40-B6C1-35AA22CFC9A4}"/>
+              </a:ext>
+            </a:extLst>
+          </p:cNvPr>
+          <p:cNvSpPr>
+            <a:spLocks noGrp="1"/>
+          </p:cNvSpPr>
+          <p:nvPr>
+            <p:ph type="title"/>
+          </p:nvPr>
+        </p:nvSpPr>
+        <p:spPr/>
+        <p:txBody>
+          <a:bodyPr/>
+          <a:lstStyle/>
+          <a:p>
+            <a:r>
+              <a:rPr lang="en-AU" dirty="0"/>
+              <a:t>Age old problems</a:t>
+            </a:r>
+          </a:p>
+        </p:txBody>
+      </p:sp>
+      <p:sp>
+        <p:nvSpPr>
+          <p:cNvPr id="3" name="Content Placeholder 2">
+            <a:extLst>
+              <a:ext uri="{FF2B5EF4-FFF2-40B4-BE49-F238E27FC236}">
+                <a16:creationId xmlns:a16="http://schemas.microsoft.com/office/drawing/2014/main" id="{49FD291D-E224-AD45-AF11-5FD0C588B9A0}"/>
+              </a:ext>
+            </a:extLst>
+          </p:cNvPr>
+          <p:cNvSpPr>
+            <a:spLocks noGrp="1"/>
+          </p:cNvSpPr>
+          <p:nvPr>
+            <p:ph idx="1"/>
+          </p:nvPr>
+        </p:nvSpPr>
+        <p:spPr/>
+        <p:txBody>
+          <a:bodyPr/>
+          <a:lstStyle/>
+          <a:p>
+            <a:pPr marL="514350" indent="-514350">
+              <a:buFont typeface="+mj-lt"/>
+              <a:buAutoNum type="arabicPeriod"/>
+            </a:pPr>
+            <a:r>
+              <a:rPr lang="en-AU" dirty="0"/>
+              <a:t>Alice is nine years older than Barry. In eight years time Alice will be twice Barry’s age. How old is Alice now?</a:t>
+            </a:r>
+          </a:p>
+          <a:p>
+            <a:pPr marL="514350" indent="-514350">
+              <a:buFont typeface="+mj-lt"/>
+              <a:buAutoNum type="arabicPeriod"/>
+            </a:pPr>
+            <a:r>
+              <a:rPr lang="en-AU" dirty="0"/>
+              <a:t>Catherine is twelve years younger than Dorothy. In six years Dorothy will be twice Catherine’s age. How old is Catherine now?</a:t>
+            </a:r>
+          </a:p>
+          <a:p>
+            <a:pPr marL="514350" indent="-514350">
+              <a:buFont typeface="+mj-lt"/>
+              <a:buAutoNum type="arabicPeriod"/>
+            </a:pPr>
+            <a:r>
+              <a:rPr lang="en-AU" dirty="0"/>
+              <a:t>Edgar if three times Fred’s age. When Edgar’s age has trebled, he will be four years older than Fred. How old is Fred now?</a:t>
+            </a:r>
+          </a:p>
+          <a:p>
+            <a:pPr marL="514350" indent="-514350">
+              <a:buFont typeface="+mj-lt"/>
+              <a:buAutoNum type="arabicPeriod"/>
+            </a:pPr>
+            <a:r>
+              <a:rPr lang="en-AU" dirty="0"/>
+              <a:t>Garry is half Hannah’s age. In 40 years time Garry will be two-thirds of Hannah’s age. How old is Garry now? </a:t>
+            </a:r>
+            <a:r>
+              <a:rPr lang="en-AU" sz="2000" dirty="0"/>
+              <a:t>[Garry and Hannah are tortoises that live for a really long time]</a:t>
+            </a:r>
+            <a:endParaRPr lang="en-AU" dirty="0"/>
+          </a:p>
+        </p:txBody>
+      </p:sp>
+    </p:spTree>
+    <p:extLst>
+      <p:ext uri="{BB962C8B-B14F-4D97-AF65-F5344CB8AC3E}">
+        <p14:creationId xmlns:p14="http://schemas.microsoft.com/office/powerpoint/2010/main" val="308073094"/>
+      </p:ext>
+    </p:extLst>
+  </p:cSld>
+  <p:clrMapOvr>
+    <a:masterClrMapping/>
+  </p:clrMapOvr>
+</p:sld>
+</file>
+
+<file path=ppt/slides/slide12.xml><?xml version="1.0" encoding="utf-8"?>
+<p:sld xmlns:a="http://schemas.openxmlformats.org/drawingml/2006/main" xmlns:r="http://schemas.openxmlformats.org/officeDocument/2006/relationships" xmlns:p="http://schemas.openxmlformats.org/presentationml/2006/main">
+  <p:cSld>
+    <p:spTree>
+      <p:nvGrpSpPr>
+        <p:cNvPr id="1" name=""/>
+        <p:cNvGrpSpPr/>
+        <p:nvPr/>
+      </p:nvGrpSpPr>
+      <p:grpSpPr>
+        <a:xfrm>
+          <a:off x="0" y="0"/>
+          <a:ext cx="0" cy="0"/>
+          <a:chOff x="0" y="0"/>
+          <a:chExt cx="0" cy="0"/>
+        </a:xfrm>
+      </p:grpSpPr>
+      <p:sp>
+        <p:nvSpPr>
+          <p:cNvPr id="2" name="Title 1">
+            <a:extLst>
+              <a:ext uri="{FF2B5EF4-FFF2-40B4-BE49-F238E27FC236}">
+                <a16:creationId xmlns:a16="http://schemas.microsoft.com/office/drawing/2014/main" id="{4E7CEAC1-5706-FD40-B6C1-35AA22CFC9A4}"/>
+              </a:ext>
+            </a:extLst>
+          </p:cNvPr>
+          <p:cNvSpPr>
+            <a:spLocks noGrp="1"/>
+          </p:cNvSpPr>
+          <p:nvPr>
+            <p:ph type="title"/>
+          </p:nvPr>
+        </p:nvSpPr>
+        <p:spPr/>
+        <p:txBody>
+          <a:bodyPr/>
+          <a:lstStyle/>
+          <a:p>
+            <a:r>
+              <a:rPr lang="en-AU" dirty="0"/>
+              <a:t>Age old problems</a:t>
+            </a:r>
+          </a:p>
+        </p:txBody>
+      </p:sp>
+      <p:sp>
+        <p:nvSpPr>
+          <p:cNvPr id="3" name="Content Placeholder 2">
+            <a:extLst>
+              <a:ext uri="{FF2B5EF4-FFF2-40B4-BE49-F238E27FC236}">
+                <a16:creationId xmlns:a16="http://schemas.microsoft.com/office/drawing/2014/main" id="{49FD291D-E224-AD45-AF11-5FD0C588B9A0}"/>
+              </a:ext>
+            </a:extLst>
+          </p:cNvPr>
+          <p:cNvSpPr>
+            <a:spLocks noGrp="1"/>
+          </p:cNvSpPr>
+          <p:nvPr>
+            <p:ph idx="1"/>
+          </p:nvPr>
+        </p:nvSpPr>
+        <p:spPr/>
+        <p:txBody>
+          <a:bodyPr/>
+          <a:lstStyle/>
+          <a:p>
+            <a:pPr marL="514350" indent="-514350">
+              <a:buFont typeface="+mj-lt"/>
+              <a:buAutoNum type="arabicPeriod" startAt="5"/>
+            </a:pPr>
+            <a:r>
+              <a:rPr lang="en-AU" dirty="0"/>
+              <a:t>Ten years ago Ian was twice Jo’s age. Now Jo is 14 years younger than Ian. How old is Ian now?</a:t>
+            </a:r>
+          </a:p>
+          <a:p>
+            <a:pPr marL="514350" indent="-514350">
+              <a:buFont typeface="+mj-lt"/>
+              <a:buAutoNum type="arabicPeriod" startAt="5"/>
+            </a:pPr>
+            <a:r>
+              <a:rPr lang="en-AU" dirty="0"/>
+              <a:t>Kate is 15 years younger than Larry. 14 years ago Larry was four times older than Kate. Is Kate allowed to vote? </a:t>
+            </a:r>
+            <a:r>
+              <a:rPr lang="en-AU" sz="1200" dirty="0"/>
+              <a:t>[Sorry, got bored of asking how old someone is]</a:t>
+            </a:r>
+            <a:endParaRPr lang="en-AU" dirty="0"/>
+          </a:p>
+          <a:p>
+            <a:pPr marL="514350" indent="-514350">
+              <a:buFont typeface="+mj-lt"/>
+              <a:buAutoNum type="arabicPeriod" startAt="5"/>
+            </a:pPr>
+            <a:endParaRPr lang="en-AU" dirty="0"/>
+          </a:p>
+        </p:txBody>
+      </p:sp>
+    </p:spTree>
+    <p:extLst>
+      <p:ext uri="{BB962C8B-B14F-4D97-AF65-F5344CB8AC3E}">
+        <p14:creationId xmlns:p14="http://schemas.microsoft.com/office/powerpoint/2010/main" val="4004959503"/>
+      </p:ext>
+    </p:extLst>
+  </p:cSld>
+  <p:clrMapOvr>
+    <a:masterClrMapping/>
+  </p:clrMapOvr>
+</p:sld>
+</file>
+
+<file path=ppt/slides/slide13.xml><?xml version="1.0" encoding="utf-8"?>
+<p:sld xmlns:a="http://schemas.openxmlformats.org/drawingml/2006/main" xmlns:r="http://schemas.openxmlformats.org/officeDocument/2006/relationships" xmlns:p="http://schemas.openxmlformats.org/presentationml/2006/main">
+  <p:cSld>
+    <p:spTree>
+      <p:nvGrpSpPr>
+        <p:cNvPr id="1" name=""/>
+        <p:cNvGrpSpPr/>
+        <p:nvPr/>
+      </p:nvGrpSpPr>
+      <p:grpSpPr>
+        <a:xfrm>
+          <a:off x="0" y="0"/>
+          <a:ext cx="0" cy="0"/>
+          <a:chOff x="0" y="0"/>
+          <a:chExt cx="0" cy="0"/>
+        </a:xfrm>
+      </p:grpSpPr>
       <p:pic>
         <p:nvPicPr>
           <p:cNvPr id="4" name="Picture 3">
@@ -6619,7 +6860,7 @@
 </p:sld>
 </file>
 
-<file path=ppt/slides/slide12.xml><?xml version="1.0" encoding="utf-8"?>
+<file path=ppt/slides/slide14.xml><?xml version="1.0" encoding="utf-8"?>
 <p:sld xmlns:a="http://schemas.openxmlformats.org/drawingml/2006/main" xmlns:r="http://schemas.openxmlformats.org/officeDocument/2006/relationships" xmlns:p="http://schemas.openxmlformats.org/presentationml/2006/main">
   <p:cSld>
     <p:spTree>
@@ -6832,7 +7073,7 @@
 </p:sld>
 </file>
 
-<file path=ppt/slides/slide13.xml><?xml version="1.0" encoding="utf-8"?>
+<file path=ppt/slides/slide15.xml><?xml version="1.0" encoding="utf-8"?>
 <p:sld xmlns:a="http://schemas.openxmlformats.org/drawingml/2006/main" xmlns:r="http://schemas.openxmlformats.org/officeDocument/2006/relationships" xmlns:p="http://schemas.openxmlformats.org/presentationml/2006/main">
   <p:cSld>
     <p:spTree>
@@ -6892,7 +7133,7 @@
 </p:sld>
 </file>
 
-<file path=ppt/slides/slide14.xml><?xml version="1.0" encoding="utf-8"?>
+<file path=ppt/slides/slide16.xml><?xml version="1.0" encoding="utf-8"?>
 <p:sld xmlns:a="http://schemas.openxmlformats.org/drawingml/2006/main" xmlns:r="http://schemas.openxmlformats.org/officeDocument/2006/relationships" xmlns:p="http://schemas.openxmlformats.org/presentationml/2006/main">
   <p:cSld>
     <p:spTree>
@@ -6970,7 +7211,7 @@
 </p:sld>
 </file>
 
-<file path=ppt/slides/slide15.xml><?xml version="1.0" encoding="utf-8"?>
+<file path=ppt/slides/slide17.xml><?xml version="1.0" encoding="utf-8"?>
 <p:sld xmlns:a="http://schemas.openxmlformats.org/drawingml/2006/main" xmlns:r="http://schemas.openxmlformats.org/officeDocument/2006/relationships" xmlns:p="http://schemas.openxmlformats.org/presentationml/2006/main">
   <p:cSld>
     <p:spTree>
@@ -7030,7 +7271,7 @@
 </p:sld>
 </file>
 
-<file path=ppt/slides/slide16.xml><?xml version="1.0" encoding="utf-8"?>
+<file path=ppt/slides/slide18.xml><?xml version="1.0" encoding="utf-8"?>
 <p:sld xmlns:a="http://schemas.openxmlformats.org/drawingml/2006/main" xmlns:r="http://schemas.openxmlformats.org/officeDocument/2006/relationships" xmlns:p="http://schemas.openxmlformats.org/presentationml/2006/main">
   <p:cSld>
     <p:spTree>
@@ -7084,7 +7325,7 @@
 </p:sld>
 </file>
 
-<file path=ppt/slides/slide17.xml><?xml version="1.0" encoding="utf-8"?>
+<file path=ppt/slides/slide19.xml><?xml version="1.0" encoding="utf-8"?>
 <p:sld xmlns:a="http://schemas.openxmlformats.org/drawingml/2006/main" xmlns:r="http://schemas.openxmlformats.org/officeDocument/2006/relationships" xmlns:p="http://schemas.openxmlformats.org/presentationml/2006/main">
   <p:cSld>
     <p:spTree>
@@ -7144,7 +7385,228 @@
 </p:sld>
 </file>
 
-<file path=ppt/slides/slide18.xml><?xml version="1.0" encoding="utf-8"?>
+<file path=ppt/slides/slide2.xml><?xml version="1.0" encoding="utf-8"?>
+<p:sld xmlns:a="http://schemas.openxmlformats.org/drawingml/2006/main" xmlns:r="http://schemas.openxmlformats.org/officeDocument/2006/relationships" xmlns:p="http://schemas.openxmlformats.org/presentationml/2006/main">
+  <p:cSld>
+    <p:spTree>
+      <p:nvGrpSpPr>
+        <p:cNvPr id="1" name=""/>
+        <p:cNvGrpSpPr/>
+        <p:nvPr/>
+      </p:nvGrpSpPr>
+      <p:grpSpPr>
+        <a:xfrm>
+          <a:off x="0" y="0"/>
+          <a:ext cx="0" cy="0"/>
+          <a:chOff x="0" y="0"/>
+          <a:chExt cx="0" cy="0"/>
+        </a:xfrm>
+      </p:grpSpPr>
+      <p:sp>
+        <p:nvSpPr>
+          <p:cNvPr id="4" name="TextBox 3"/>
+          <p:cNvSpPr txBox="1"/>
+          <p:nvPr/>
+        </p:nvSpPr>
+        <p:spPr>
+          <a:xfrm>
+            <a:off x="501314" y="305693"/>
+            <a:ext cx="5370097" cy="5693866"/>
+          </a:xfrm>
+          <a:prstGeom prst="rect">
+            <a:avLst/>
+          </a:prstGeom>
+          <a:noFill/>
+        </p:spPr>
+        <p:txBody>
+          <a:bodyPr wrap="square" rtlCol="0">
+            <a:spAutoFit/>
+          </a:bodyPr>
+          <a:lstStyle/>
+          <a:p>
+            <a:r>
+              <a:rPr lang="en-AU" sz="2800" b="1" dirty="0"/>
+              <a:t>Learning Intention</a:t>
+            </a:r>
+          </a:p>
+          <a:p>
+            <a:r>
+              <a:rPr lang="en-AU" sz="2800" dirty="0"/>
+              <a:t>To understand algebraic representations</a:t>
+            </a:r>
+            <a:r>
+              <a:rPr lang="en-GB" sz="2800" dirty="0">
+                <a:effectLst/>
+              </a:rPr>
+              <a:t> </a:t>
+            </a:r>
+          </a:p>
+          <a:p>
+            <a:endParaRPr lang="en-AU" sz="2800" dirty="0"/>
+          </a:p>
+          <a:p>
+            <a:r>
+              <a:rPr lang="en-AU" sz="2800" b="1" dirty="0"/>
+              <a:t>Success Criteria</a:t>
+            </a:r>
+          </a:p>
+          <a:p>
+            <a:r>
+              <a:rPr lang="en-AU" sz="2800" dirty="0"/>
+              <a:t>I can:</a:t>
+            </a:r>
+            <a:endParaRPr lang="en-GB" sz="2800" dirty="0"/>
+          </a:p>
+          <a:p>
+            <a:pPr marL="285750" lvl="0" indent="-285750">
+              <a:buFont typeface="Arial" charset="0"/>
+              <a:buChar char="•"/>
+            </a:pPr>
+            <a:r>
+              <a:rPr lang="en-AU" sz="2800" dirty="0">
+                <a:solidFill>
+                  <a:schemeClr val="accent6"/>
+                </a:solidFill>
+              </a:rPr>
+              <a:t>define</a:t>
+            </a:r>
+            <a:r>
+              <a:rPr lang="en-AU" sz="2800" dirty="0"/>
+              <a:t> variables</a:t>
+            </a:r>
+          </a:p>
+          <a:p>
+            <a:pPr marL="285750" lvl="0" indent="-285750">
+              <a:buFont typeface="Arial" charset="0"/>
+              <a:buChar char="•"/>
+            </a:pPr>
+            <a:r>
+              <a:rPr lang="en-AU" sz="2800" dirty="0">
+                <a:solidFill>
+                  <a:schemeClr val="accent6"/>
+                </a:solidFill>
+              </a:rPr>
+              <a:t>combine</a:t>
+            </a:r>
+            <a:r>
+              <a:rPr lang="en-AU" sz="2800" dirty="0"/>
+              <a:t> variables to form expressions</a:t>
+            </a:r>
+            <a:endParaRPr lang="en-GB" sz="2800" dirty="0"/>
+          </a:p>
+          <a:p>
+            <a:pPr marL="285750" lvl="0" indent="-285750">
+              <a:buFont typeface="Arial" charset="0"/>
+              <a:buChar char="•"/>
+            </a:pPr>
+            <a:r>
+              <a:rPr lang="en-AU" sz="2800" dirty="0">
+                <a:solidFill>
+                  <a:schemeClr val="accent5"/>
+                </a:solidFill>
+              </a:rPr>
+              <a:t>generalise</a:t>
+            </a:r>
+            <a:r>
+              <a:rPr lang="en-AU" sz="2800" dirty="0"/>
+              <a:t> a pattern with an algebraic expression</a:t>
+            </a:r>
+            <a:endParaRPr lang="en-GB" sz="2800" dirty="0"/>
+          </a:p>
+          <a:p>
+            <a:pPr marL="285750" lvl="0" indent="-285750">
+              <a:buFont typeface="Arial" charset="0"/>
+              <a:buChar char="•"/>
+            </a:pPr>
+            <a:r>
+              <a:rPr lang="en-AU" sz="2800" dirty="0">
+                <a:solidFill>
+                  <a:schemeClr val="accent5"/>
+                </a:solidFill>
+              </a:rPr>
+              <a:t>construct</a:t>
+            </a:r>
+            <a:r>
+              <a:rPr lang="en-AU" sz="2800" dirty="0"/>
+              <a:t> a mathematical model (equation) to solve a problem</a:t>
+            </a:r>
+            <a:r>
+              <a:rPr lang="en-GB" sz="2800" dirty="0">
+                <a:effectLst/>
+              </a:rPr>
+              <a:t> </a:t>
+            </a:r>
+            <a:endParaRPr lang="en-AU" sz="2800" dirty="0"/>
+          </a:p>
+        </p:txBody>
+      </p:sp>
+      <p:sp>
+        <p:nvSpPr>
+          <p:cNvPr id="6" name="TextBox 5"/>
+          <p:cNvSpPr txBox="1"/>
+          <p:nvPr/>
+        </p:nvSpPr>
+        <p:spPr>
+          <a:xfrm>
+            <a:off x="7964905" y="305693"/>
+            <a:ext cx="4010906" cy="1384995"/>
+          </a:xfrm>
+          <a:prstGeom prst="rect">
+            <a:avLst/>
+          </a:prstGeom>
+          <a:noFill/>
+        </p:spPr>
+        <p:txBody>
+          <a:bodyPr wrap="none" rtlCol="0">
+            <a:spAutoFit/>
+          </a:bodyPr>
+          <a:lstStyle/>
+          <a:p>
+            <a:pPr algn="r"/>
+            <a:r>
+              <a:rPr lang="en-AU" sz="2800" b="1" dirty="0"/>
+              <a:t>Problem Solving Strategy:</a:t>
+            </a:r>
+          </a:p>
+          <a:p>
+            <a:pPr algn="r"/>
+            <a:endParaRPr lang="en-AU" sz="2800" dirty="0"/>
+          </a:p>
+          <a:p>
+            <a:pPr algn="r"/>
+            <a:r>
+              <a:rPr lang="en-AU" sz="2800" dirty="0"/>
+              <a:t>Form an Equation</a:t>
+            </a:r>
+          </a:p>
+        </p:txBody>
+      </p:sp>
+    </p:spTree>
+    <p:extLst>
+      <p:ext uri="{BB962C8B-B14F-4D97-AF65-F5344CB8AC3E}">
+        <p14:creationId xmlns:p14="http://schemas.microsoft.com/office/powerpoint/2010/main" val="981893482"/>
+      </p:ext>
+    </p:extLst>
+  </p:cSld>
+  <p:clrMapOvr>
+    <a:masterClrMapping/>
+  </p:clrMapOvr>
+  <mc:AlternateContent xmlns:mc="http://schemas.openxmlformats.org/markup-compatibility/2006" xmlns:p14="http://schemas.microsoft.com/office/powerpoint/2010/main">
+    <mc:Choice Requires="p14">
+      <p:transition spd="slow" p14:dur="1200">
+        <p:fade/>
+      </p:transition>
+    </mc:Choice>
+    <mc:Fallback xmlns="">
+      <p:transition spd="slow">
+        <p:fade/>
+      </p:transition>
+    </mc:Fallback>
+  </mc:AlternateContent>
+</p:sld>
+</file>
+
+<file path=ppt/slides/slide20.xml><?xml version="1.0" encoding="utf-8"?>
 <p:sld xmlns:a="http://schemas.openxmlformats.org/drawingml/2006/main" xmlns:r="http://schemas.openxmlformats.org/officeDocument/2006/relationships" xmlns:p="http://schemas.openxmlformats.org/presentationml/2006/main">
   <p:cSld>
     <p:spTree>
@@ -7198,7 +7660,7 @@
 </p:sld>
 </file>
 
-<file path=ppt/slides/slide19.xml><?xml version="1.0" encoding="utf-8"?>
+<file path=ppt/slides/slide21.xml><?xml version="1.0" encoding="utf-8"?>
 <p:sld xmlns:a="http://schemas.openxmlformats.org/drawingml/2006/main" xmlns:r="http://schemas.openxmlformats.org/officeDocument/2006/relationships" xmlns:p="http://schemas.openxmlformats.org/presentationml/2006/main">
   <p:cSld>
     <p:spTree>
@@ -7252,228 +7714,7 @@
 </p:sld>
 </file>
 
-<file path=ppt/slides/slide2.xml><?xml version="1.0" encoding="utf-8"?>
-<p:sld xmlns:a="http://schemas.openxmlformats.org/drawingml/2006/main" xmlns:r="http://schemas.openxmlformats.org/officeDocument/2006/relationships" xmlns:p="http://schemas.openxmlformats.org/presentationml/2006/main">
-  <p:cSld>
-    <p:spTree>
-      <p:nvGrpSpPr>
-        <p:cNvPr id="1" name=""/>
-        <p:cNvGrpSpPr/>
-        <p:nvPr/>
-      </p:nvGrpSpPr>
-      <p:grpSpPr>
-        <a:xfrm>
-          <a:off x="0" y="0"/>
-          <a:ext cx="0" cy="0"/>
-          <a:chOff x="0" y="0"/>
-          <a:chExt cx="0" cy="0"/>
-        </a:xfrm>
-      </p:grpSpPr>
-      <p:sp>
-        <p:nvSpPr>
-          <p:cNvPr id="4" name="TextBox 3"/>
-          <p:cNvSpPr txBox="1"/>
-          <p:nvPr/>
-        </p:nvSpPr>
-        <p:spPr>
-          <a:xfrm>
-            <a:off x="501314" y="305693"/>
-            <a:ext cx="5370097" cy="5693866"/>
-          </a:xfrm>
-          <a:prstGeom prst="rect">
-            <a:avLst/>
-          </a:prstGeom>
-          <a:noFill/>
-        </p:spPr>
-        <p:txBody>
-          <a:bodyPr wrap="square" rtlCol="0">
-            <a:spAutoFit/>
-          </a:bodyPr>
-          <a:lstStyle/>
-          <a:p>
-            <a:r>
-              <a:rPr lang="en-AU" sz="2800" b="1" dirty="0"/>
-              <a:t>Learning Intention</a:t>
-            </a:r>
-          </a:p>
-          <a:p>
-            <a:r>
-              <a:rPr lang="en-AU" sz="2800" dirty="0"/>
-              <a:t>To understand algebraic representations</a:t>
-            </a:r>
-            <a:r>
-              <a:rPr lang="en-GB" sz="2800" dirty="0">
-                <a:effectLst/>
-              </a:rPr>
-              <a:t> </a:t>
-            </a:r>
-          </a:p>
-          <a:p>
-            <a:endParaRPr lang="en-AU" sz="2800" dirty="0"/>
-          </a:p>
-          <a:p>
-            <a:r>
-              <a:rPr lang="en-AU" sz="2800" b="1" dirty="0"/>
-              <a:t>Success Criteria</a:t>
-            </a:r>
-          </a:p>
-          <a:p>
-            <a:r>
-              <a:rPr lang="en-AU" sz="2800" dirty="0"/>
-              <a:t>I can:</a:t>
-            </a:r>
-            <a:endParaRPr lang="en-GB" sz="2800" dirty="0"/>
-          </a:p>
-          <a:p>
-            <a:pPr marL="285750" lvl="0" indent="-285750">
-              <a:buFont typeface="Arial" charset="0"/>
-              <a:buChar char="•"/>
-            </a:pPr>
-            <a:r>
-              <a:rPr lang="en-AU" sz="2800" dirty="0">
-                <a:solidFill>
-                  <a:schemeClr val="accent6"/>
-                </a:solidFill>
-              </a:rPr>
-              <a:t>define</a:t>
-            </a:r>
-            <a:r>
-              <a:rPr lang="en-AU" sz="2800" dirty="0"/>
-              <a:t> variables</a:t>
-            </a:r>
-          </a:p>
-          <a:p>
-            <a:pPr marL="285750" lvl="0" indent="-285750">
-              <a:buFont typeface="Arial" charset="0"/>
-              <a:buChar char="•"/>
-            </a:pPr>
-            <a:r>
-              <a:rPr lang="en-AU" sz="2800" dirty="0">
-                <a:solidFill>
-                  <a:schemeClr val="accent6"/>
-                </a:solidFill>
-              </a:rPr>
-              <a:t>combine</a:t>
-            </a:r>
-            <a:r>
-              <a:rPr lang="en-AU" sz="2800" dirty="0"/>
-              <a:t> variables to form expressions</a:t>
-            </a:r>
-            <a:endParaRPr lang="en-GB" sz="2800" dirty="0"/>
-          </a:p>
-          <a:p>
-            <a:pPr marL="285750" lvl="0" indent="-285750">
-              <a:buFont typeface="Arial" charset="0"/>
-              <a:buChar char="•"/>
-            </a:pPr>
-            <a:r>
-              <a:rPr lang="en-AU" sz="2800" dirty="0">
-                <a:solidFill>
-                  <a:schemeClr val="accent5"/>
-                </a:solidFill>
-              </a:rPr>
-              <a:t>generalise</a:t>
-            </a:r>
-            <a:r>
-              <a:rPr lang="en-AU" sz="2800" dirty="0"/>
-              <a:t> a pattern with an algebraic expression</a:t>
-            </a:r>
-            <a:endParaRPr lang="en-GB" sz="2800" dirty="0"/>
-          </a:p>
-          <a:p>
-            <a:pPr marL="285750" lvl="0" indent="-285750">
-              <a:buFont typeface="Arial" charset="0"/>
-              <a:buChar char="•"/>
-            </a:pPr>
-            <a:r>
-              <a:rPr lang="en-AU" sz="2800" dirty="0">
-                <a:solidFill>
-                  <a:schemeClr val="accent5"/>
-                </a:solidFill>
-              </a:rPr>
-              <a:t>construct</a:t>
-            </a:r>
-            <a:r>
-              <a:rPr lang="en-AU" sz="2800" dirty="0"/>
-              <a:t> a mathematical model (equation) to solve a problem</a:t>
-            </a:r>
-            <a:r>
-              <a:rPr lang="en-GB" sz="2800" dirty="0">
-                <a:effectLst/>
-              </a:rPr>
-              <a:t> </a:t>
-            </a:r>
-            <a:endParaRPr lang="en-AU" sz="2800" dirty="0"/>
-          </a:p>
-        </p:txBody>
-      </p:sp>
-      <p:sp>
-        <p:nvSpPr>
-          <p:cNvPr id="6" name="TextBox 5"/>
-          <p:cNvSpPr txBox="1"/>
-          <p:nvPr/>
-        </p:nvSpPr>
-        <p:spPr>
-          <a:xfrm>
-            <a:off x="7964905" y="305693"/>
-            <a:ext cx="4010906" cy="1384995"/>
-          </a:xfrm>
-          <a:prstGeom prst="rect">
-            <a:avLst/>
-          </a:prstGeom>
-          <a:noFill/>
-        </p:spPr>
-        <p:txBody>
-          <a:bodyPr wrap="none" rtlCol="0">
-            <a:spAutoFit/>
-          </a:bodyPr>
-          <a:lstStyle/>
-          <a:p>
-            <a:pPr algn="r"/>
-            <a:r>
-              <a:rPr lang="en-AU" sz="2800" b="1" dirty="0"/>
-              <a:t>Problem Solving Strategy:</a:t>
-            </a:r>
-          </a:p>
-          <a:p>
-            <a:pPr algn="r"/>
-            <a:endParaRPr lang="en-AU" sz="2800" dirty="0"/>
-          </a:p>
-          <a:p>
-            <a:pPr algn="r"/>
-            <a:r>
-              <a:rPr lang="en-AU" sz="2800" dirty="0"/>
-              <a:t>Form an Equation</a:t>
-            </a:r>
-          </a:p>
-        </p:txBody>
-      </p:sp>
-    </p:spTree>
-    <p:extLst>
-      <p:ext uri="{BB962C8B-B14F-4D97-AF65-F5344CB8AC3E}">
-        <p14:creationId xmlns:p14="http://schemas.microsoft.com/office/powerpoint/2010/main" val="981893482"/>
-      </p:ext>
-    </p:extLst>
-  </p:cSld>
-  <p:clrMapOvr>
-    <a:masterClrMapping/>
-  </p:clrMapOvr>
-  <mc:AlternateContent xmlns:mc="http://schemas.openxmlformats.org/markup-compatibility/2006" xmlns:p14="http://schemas.microsoft.com/office/powerpoint/2010/main">
-    <mc:Choice Requires="p14">
-      <p:transition spd="slow" p14:dur="1200">
-        <p:fade/>
-      </p:transition>
-    </mc:Choice>
-    <mc:Fallback xmlns="">
-      <p:transition spd="slow">
-        <p:fade/>
-      </p:transition>
-    </mc:Fallback>
-  </mc:AlternateContent>
-</p:sld>
-</file>
-
-<file path=ppt/slides/slide20.xml><?xml version="1.0" encoding="utf-8"?>
+<file path=ppt/slides/slide22.xml><?xml version="1.0" encoding="utf-8"?>
 <p:sld xmlns:a="http://schemas.openxmlformats.org/drawingml/2006/main" xmlns:r="http://schemas.openxmlformats.org/officeDocument/2006/relationships" xmlns:p="http://schemas.openxmlformats.org/presentationml/2006/main">
   <p:cSld>
     <p:spTree>
@@ -7563,7 +7804,7 @@
 </p:sld>
 </file>
 
-<file path=ppt/slides/slide21.xml><?xml version="1.0" encoding="utf-8"?>
+<file path=ppt/slides/slide23.xml><?xml version="1.0" encoding="utf-8"?>
 <p:sld xmlns:a="http://schemas.openxmlformats.org/drawingml/2006/main" xmlns:r="http://schemas.openxmlformats.org/officeDocument/2006/relationships" xmlns:p="http://schemas.openxmlformats.org/presentationml/2006/main">
   <p:cSld>
     <p:spTree>
@@ -7647,7 +7888,7 @@
 </p:sld>
 </file>
 
-<file path=ppt/slides/slide22.xml><?xml version="1.0" encoding="utf-8"?>
+<file path=ppt/slides/slide24.xml><?xml version="1.0" encoding="utf-8"?>
 <p:sld xmlns:a="http://schemas.openxmlformats.org/drawingml/2006/main" xmlns:r="http://schemas.openxmlformats.org/officeDocument/2006/relationships" xmlns:p="http://schemas.openxmlformats.org/presentationml/2006/main">
   <p:cSld>
     <p:spTree>
@@ -7737,7 +7978,7 @@
 </p:sld>
 </file>
 
-<file path=ppt/slides/slide23.xml><?xml version="1.0" encoding="utf-8"?>
+<file path=ppt/slides/slide25.xml><?xml version="1.0" encoding="utf-8"?>
 <p:sld xmlns:a="http://schemas.openxmlformats.org/drawingml/2006/main" xmlns:r="http://schemas.openxmlformats.org/officeDocument/2006/relationships" xmlns:p="http://schemas.openxmlformats.org/presentationml/2006/main">
   <p:cSld>
     <p:spTree>
@@ -7827,7 +8068,7 @@
 </p:sld>
 </file>
 
-<file path=ppt/slides/slide24.xml><?xml version="1.0" encoding="utf-8"?>
+<file path=ppt/slides/slide26.xml><?xml version="1.0" encoding="utf-8"?>
 <p:sld xmlns:a="http://schemas.openxmlformats.org/drawingml/2006/main" xmlns:r="http://schemas.openxmlformats.org/officeDocument/2006/relationships" xmlns:p="http://schemas.openxmlformats.org/presentationml/2006/main">
   <p:cSld>
     <p:spTree>
@@ -7917,7 +8158,7 @@
 </p:sld>
 </file>
 
-<file path=ppt/slides/slide25.xml><?xml version="1.0" encoding="utf-8"?>
+<file path=ppt/slides/slide27.xml><?xml version="1.0" encoding="utf-8"?>
 <p:sld xmlns:a="http://schemas.openxmlformats.org/drawingml/2006/main" xmlns:r="http://schemas.openxmlformats.org/officeDocument/2006/relationships" xmlns:p="http://schemas.openxmlformats.org/presentationml/2006/main">
   <p:cSld>
     <p:spTree>
@@ -8007,7 +8248,7 @@
 </p:sld>
 </file>
 
-<file path=ppt/slides/slide26.xml><?xml version="1.0" encoding="utf-8"?>
+<file path=ppt/slides/slide28.xml><?xml version="1.0" encoding="utf-8"?>
 <p:sld xmlns:a="http://schemas.openxmlformats.org/drawingml/2006/main" xmlns:r="http://schemas.openxmlformats.org/officeDocument/2006/relationships" xmlns:p="http://schemas.openxmlformats.org/presentationml/2006/main">
   <p:cSld>
     <p:spTree>
@@ -8075,7 +8316,7 @@
 </p:sld>
 </file>
 
-<file path=ppt/slides/slide27.xml><?xml version="1.0" encoding="utf-8"?>
+<file path=ppt/slides/slide29.xml><?xml version="1.0" encoding="utf-8"?>
 <p:sld xmlns:a="http://schemas.openxmlformats.org/drawingml/2006/main" xmlns:r="http://schemas.openxmlformats.org/officeDocument/2006/relationships" xmlns:p="http://schemas.openxmlformats.org/presentationml/2006/main">
   <p:cSld>
     <p:spTree>
@@ -8120,114 +8361,6 @@
     <p:extLst>
       <p:ext uri="{BB962C8B-B14F-4D97-AF65-F5344CB8AC3E}">
         <p14:creationId xmlns:p14="http://schemas.microsoft.com/office/powerpoint/2010/main" val="1526862246"/>
-      </p:ext>
-    </p:extLst>
-  </p:cSld>
-  <p:clrMapOvr>
-    <a:masterClrMapping/>
-  </p:clrMapOvr>
-</p:sld>
-</file>
-
-<file path=ppt/slides/slide28.xml><?xml version="1.0" encoding="utf-8"?>
-<p:sld xmlns:a="http://schemas.openxmlformats.org/drawingml/2006/main" xmlns:r="http://schemas.openxmlformats.org/officeDocument/2006/relationships" xmlns:p="http://schemas.openxmlformats.org/presentationml/2006/main">
-  <p:cSld>
-    <p:spTree>
-      <p:nvGrpSpPr>
-        <p:cNvPr id="1" name=""/>
-        <p:cNvGrpSpPr/>
-        <p:nvPr/>
-      </p:nvGrpSpPr>
-      <p:grpSpPr>
-        <a:xfrm>
-          <a:off x="0" y="0"/>
-          <a:ext cx="0" cy="0"/>
-          <a:chOff x="0" y="0"/>
-          <a:chExt cx="0" cy="0"/>
-        </a:xfrm>
-      </p:grpSpPr>
-      <p:pic>
-        <p:nvPicPr>
-          <p:cNvPr id="3" name="Picture 2"/>
-          <p:cNvPicPr>
-            <a:picLocks noChangeAspect="1"/>
-          </p:cNvPicPr>
-          <p:nvPr/>
-        </p:nvPicPr>
-        <p:blipFill>
-          <a:blip r:embed="rId3"/>
-          <a:stretch>
-            <a:fillRect/>
-          </a:stretch>
-        </p:blipFill>
-        <p:spPr>
-          <a:xfrm>
-            <a:off x="1924050" y="1168400"/>
-            <a:ext cx="8343900" cy="4521200"/>
-          </a:xfrm>
-          <a:prstGeom prst="rect">
-            <a:avLst/>
-          </a:prstGeom>
-        </p:spPr>
-      </p:pic>
-    </p:spTree>
-    <p:extLst>
-      <p:ext uri="{BB962C8B-B14F-4D97-AF65-F5344CB8AC3E}">
-        <p14:creationId xmlns:p14="http://schemas.microsoft.com/office/powerpoint/2010/main" val="722117325"/>
-      </p:ext>
-    </p:extLst>
-  </p:cSld>
-  <p:clrMapOvr>
-    <a:masterClrMapping/>
-  </p:clrMapOvr>
-</p:sld>
-</file>
-
-<file path=ppt/slides/slide29.xml><?xml version="1.0" encoding="utf-8"?>
-<p:sld xmlns:a="http://schemas.openxmlformats.org/drawingml/2006/main" xmlns:r="http://schemas.openxmlformats.org/officeDocument/2006/relationships" xmlns:p="http://schemas.openxmlformats.org/presentationml/2006/main">
-  <p:cSld>
-    <p:spTree>
-      <p:nvGrpSpPr>
-        <p:cNvPr id="1" name=""/>
-        <p:cNvGrpSpPr/>
-        <p:nvPr/>
-      </p:nvGrpSpPr>
-      <p:grpSpPr>
-        <a:xfrm>
-          <a:off x="0" y="0"/>
-          <a:ext cx="0" cy="0"/>
-          <a:chOff x="0" y="0"/>
-          <a:chExt cx="0" cy="0"/>
-        </a:xfrm>
-      </p:grpSpPr>
-      <p:pic>
-        <p:nvPicPr>
-          <p:cNvPr id="2" name="Picture 1"/>
-          <p:cNvPicPr>
-            <a:picLocks noChangeAspect="1"/>
-          </p:cNvPicPr>
-          <p:nvPr/>
-        </p:nvPicPr>
-        <p:blipFill>
-          <a:blip r:embed="rId3"/>
-          <a:stretch>
-            <a:fillRect/>
-          </a:stretch>
-        </p:blipFill>
-        <p:spPr>
-          <a:xfrm>
-            <a:off x="1078162" y="544762"/>
-            <a:ext cx="9861202" cy="5856037"/>
-          </a:xfrm>
-          <a:prstGeom prst="rect">
-            <a:avLst/>
-          </a:prstGeom>
-        </p:spPr>
-      </p:pic>
-    </p:spTree>
-    <p:extLst>
-      <p:ext uri="{BB962C8B-B14F-4D97-AF65-F5344CB8AC3E}">
-        <p14:creationId xmlns:p14="http://schemas.microsoft.com/office/powerpoint/2010/main" val="1552657509"/>
       </p:ext>
     </p:extLst>
   </p:cSld>
@@ -9608,6 +9741,114 @@
         </p:blipFill>
         <p:spPr>
           <a:xfrm>
+            <a:off x="1924050" y="1168400"/>
+            <a:ext cx="8343900" cy="4521200"/>
+          </a:xfrm>
+          <a:prstGeom prst="rect">
+            <a:avLst/>
+          </a:prstGeom>
+        </p:spPr>
+      </p:pic>
+    </p:spTree>
+    <p:extLst>
+      <p:ext uri="{BB962C8B-B14F-4D97-AF65-F5344CB8AC3E}">
+        <p14:creationId xmlns:p14="http://schemas.microsoft.com/office/powerpoint/2010/main" val="722117325"/>
+      </p:ext>
+    </p:extLst>
+  </p:cSld>
+  <p:clrMapOvr>
+    <a:masterClrMapping/>
+  </p:clrMapOvr>
+</p:sld>
+</file>
+
+<file path=ppt/slides/slide31.xml><?xml version="1.0" encoding="utf-8"?>
+<p:sld xmlns:a="http://schemas.openxmlformats.org/drawingml/2006/main" xmlns:r="http://schemas.openxmlformats.org/officeDocument/2006/relationships" xmlns:p="http://schemas.openxmlformats.org/presentationml/2006/main">
+  <p:cSld>
+    <p:spTree>
+      <p:nvGrpSpPr>
+        <p:cNvPr id="1" name=""/>
+        <p:cNvGrpSpPr/>
+        <p:nvPr/>
+      </p:nvGrpSpPr>
+      <p:grpSpPr>
+        <a:xfrm>
+          <a:off x="0" y="0"/>
+          <a:ext cx="0" cy="0"/>
+          <a:chOff x="0" y="0"/>
+          <a:chExt cx="0" cy="0"/>
+        </a:xfrm>
+      </p:grpSpPr>
+      <p:pic>
+        <p:nvPicPr>
+          <p:cNvPr id="2" name="Picture 1"/>
+          <p:cNvPicPr>
+            <a:picLocks noChangeAspect="1"/>
+          </p:cNvPicPr>
+          <p:nvPr/>
+        </p:nvPicPr>
+        <p:blipFill>
+          <a:blip r:embed="rId3"/>
+          <a:stretch>
+            <a:fillRect/>
+          </a:stretch>
+        </p:blipFill>
+        <p:spPr>
+          <a:xfrm>
+            <a:off x="1078162" y="544762"/>
+            <a:ext cx="9861202" cy="5856037"/>
+          </a:xfrm>
+          <a:prstGeom prst="rect">
+            <a:avLst/>
+          </a:prstGeom>
+        </p:spPr>
+      </p:pic>
+    </p:spTree>
+    <p:extLst>
+      <p:ext uri="{BB962C8B-B14F-4D97-AF65-F5344CB8AC3E}">
+        <p14:creationId xmlns:p14="http://schemas.microsoft.com/office/powerpoint/2010/main" val="1552657509"/>
+      </p:ext>
+    </p:extLst>
+  </p:cSld>
+  <p:clrMapOvr>
+    <a:masterClrMapping/>
+  </p:clrMapOvr>
+</p:sld>
+</file>
+
+<file path=ppt/slides/slide32.xml><?xml version="1.0" encoding="utf-8"?>
+<p:sld xmlns:a="http://schemas.openxmlformats.org/drawingml/2006/main" xmlns:r="http://schemas.openxmlformats.org/officeDocument/2006/relationships" xmlns:p="http://schemas.openxmlformats.org/presentationml/2006/main">
+  <p:cSld>
+    <p:spTree>
+      <p:nvGrpSpPr>
+        <p:cNvPr id="1" name=""/>
+        <p:cNvGrpSpPr/>
+        <p:nvPr/>
+      </p:nvGrpSpPr>
+      <p:grpSpPr>
+        <a:xfrm>
+          <a:off x="0" y="0"/>
+          <a:ext cx="0" cy="0"/>
+          <a:chOff x="0" y="0"/>
+          <a:chExt cx="0" cy="0"/>
+        </a:xfrm>
+      </p:grpSpPr>
+      <p:pic>
+        <p:nvPicPr>
+          <p:cNvPr id="3" name="Picture 2"/>
+          <p:cNvPicPr>
+            <a:picLocks noChangeAspect="1"/>
+          </p:cNvPicPr>
+          <p:nvPr/>
+        </p:nvPicPr>
+        <p:blipFill>
+          <a:blip r:embed="rId3"/>
+          <a:stretch>
+            <a:fillRect/>
+          </a:stretch>
+        </p:blipFill>
+        <p:spPr>
+          <a:xfrm>
             <a:off x="1949450" y="914400"/>
             <a:ext cx="8293100" cy="5029200"/>
           </a:xfrm>
@@ -9629,7 +9870,7 @@
 </p:sld>
 </file>
 
-<file path=ppt/slides/slide31.xml><?xml version="1.0" encoding="utf-8"?>
+<file path=ppt/slides/slide33.xml><?xml version="1.0" encoding="utf-8"?>
 <p:sld xmlns:a="http://schemas.openxmlformats.org/drawingml/2006/main" xmlns:r="http://schemas.openxmlformats.org/officeDocument/2006/relationships" xmlns:p="http://schemas.openxmlformats.org/presentationml/2006/main">
   <p:cSld>
     <p:spTree>

</xml_diff>